<commit_message>
Add references to classification slides
</commit_message>
<xml_diff>
--- a/slides/pptx/4-classification.pptx
+++ b/slides/pptx/4-classification.pptx
@@ -220,7 +220,7 @@
           <a:p>
             <a:fld id="{BE1256C8-1BA4-4200-90F3-9413893DDEA5}" type="datetimeFigureOut">
               <a:rPr lang="en-US" smtClean="0"/>
-              <a:t>4/21/2018</a:t>
+              <a:t>4/22/2018</a:t>
             </a:fld>
             <a:endParaRPr lang="en-US"/>
           </a:p>
@@ -2244,7 +2244,6 @@
               <a:rPr lang="en-US" baseline="0" dirty="0" smtClean="0"/>
               <a:t>ML classification models exists also as APIS and can be used as needed such as the Crisis event extraction service.</a:t>
             </a:r>
-            <a:endParaRPr lang="en-US" baseline="0" dirty="0" smtClean="0"/>
           </a:p>
         </p:txBody>
       </p:sp>
@@ -2482,11 +2481,7 @@
             </a:pPr>
             <a:r>
               <a:rPr lang="en-US" dirty="0" smtClean="0"/>
-              <a:t>So</a:t>
-            </a:r>
-            <a:r>
-              <a:rPr lang="en-US" dirty="0" smtClean="0"/>
-              <a:t>, broadly there are two families</a:t>
+              <a:t>So, broadly there are two families</a:t>
             </a:r>
             <a:r>
               <a:rPr lang="en-US" baseline="0" dirty="0" smtClean="0"/>
@@ -2498,11 +2493,7 @@
             </a:r>
             <a:r>
               <a:rPr lang="en-US" baseline="0" dirty="0" smtClean="0"/>
-              <a:t> into labels and classes. And then we use these are the ground truth data to train the classifier so they can automatically learn to classify new unseen data into these labels/categories. In UNSUPERVISED classification, we do not provide any training data a priori, instead discover the related elements based on some similarity metric</a:t>
-            </a:r>
-            <a:r>
-              <a:rPr lang="en-US" baseline="0" dirty="0" smtClean="0"/>
-              <a:t>.</a:t>
+              <a:t> into labels and classes. And then we use these are the ground truth data to train the classifier so they can automatically learn to classify new unseen data into these labels/categories. In UNSUPERVISED classification, we do not provide any training data a priori, instead discover the related elements based on some similarity metric.</a:t>
             </a:r>
           </a:p>
           <a:p>
@@ -3334,7 +3325,7 @@
           <a:p>
             <a:fld id="{57763156-F63F-45AB-B3F8-61CC0A4BEA6A}" type="datetime1">
               <a:rPr lang="en-GB" smtClean="0"/>
-              <a:t>21/04/2018</a:t>
+              <a:t>22/04/2018</a:t>
             </a:fld>
             <a:endParaRPr lang="en-GB"/>
           </a:p>
@@ -3504,7 +3495,7 @@
           <a:p>
             <a:fld id="{14BEECE9-20C9-45D7-AB53-CA411A5FA534}" type="datetime1">
               <a:rPr lang="en-GB" smtClean="0"/>
-              <a:t>21/04/2018</a:t>
+              <a:t>22/04/2018</a:t>
             </a:fld>
             <a:endParaRPr lang="en-GB"/>
           </a:p>
@@ -3684,7 +3675,7 @@
           <a:p>
             <a:fld id="{71AC76DC-8E58-4714-866B-5CCB322C9264}" type="datetime1">
               <a:rPr lang="en-GB" smtClean="0"/>
-              <a:t>21/04/2018</a:t>
+              <a:t>22/04/2018</a:t>
             </a:fld>
             <a:endParaRPr lang="en-GB"/>
           </a:p>
@@ -3854,7 +3845,7 @@
           <a:p>
             <a:fld id="{DFC15704-F215-4509-A1A2-B1A12E74556F}" type="datetime1">
               <a:rPr lang="en-GB" smtClean="0"/>
-              <a:t>21/04/2018</a:t>
+              <a:t>22/04/2018</a:t>
             </a:fld>
             <a:endParaRPr lang="en-GB"/>
           </a:p>
@@ -4098,7 +4089,7 @@
           <a:p>
             <a:fld id="{392ADA6A-D818-43C3-9F7F-2F28E69D78B6}" type="datetime1">
               <a:rPr lang="en-GB" smtClean="0"/>
-              <a:t>21/04/2018</a:t>
+              <a:t>22/04/2018</a:t>
             </a:fld>
             <a:endParaRPr lang="en-GB"/>
           </a:p>
@@ -4330,7 +4321,7 @@
           <a:p>
             <a:fld id="{C7FCF681-0D17-4460-8C9F-49B85F7A2E00}" type="datetime1">
               <a:rPr lang="en-GB" smtClean="0"/>
-              <a:t>21/04/2018</a:t>
+              <a:t>22/04/2018</a:t>
             </a:fld>
             <a:endParaRPr lang="en-GB"/>
           </a:p>
@@ -4697,7 +4688,7 @@
           <a:p>
             <a:fld id="{F592DD51-5C55-433A-BB22-2ABF05370CA6}" type="datetime1">
               <a:rPr lang="en-GB" smtClean="0"/>
-              <a:t>21/04/2018</a:t>
+              <a:t>22/04/2018</a:t>
             </a:fld>
             <a:endParaRPr lang="en-GB"/>
           </a:p>
@@ -4815,7 +4806,7 @@
           <a:p>
             <a:fld id="{A97C0150-2929-4832-9063-FBB3235391DF}" type="datetime1">
               <a:rPr lang="en-GB" smtClean="0"/>
-              <a:t>21/04/2018</a:t>
+              <a:t>22/04/2018</a:t>
             </a:fld>
             <a:endParaRPr lang="en-GB"/>
           </a:p>
@@ -4910,7 +4901,7 @@
           <a:p>
             <a:fld id="{4692F702-1EC7-4E05-9607-554DE0A8E0FE}" type="datetime1">
               <a:rPr lang="en-GB" smtClean="0"/>
-              <a:t>21/04/2018</a:t>
+              <a:t>22/04/2018</a:t>
             </a:fld>
             <a:endParaRPr lang="en-GB"/>
           </a:p>
@@ -5187,7 +5178,7 @@
           <a:p>
             <a:fld id="{24C2DD65-6AF0-44F2-884B-2162E18F760E}" type="datetime1">
               <a:rPr lang="en-GB" smtClean="0"/>
-              <a:t>21/04/2018</a:t>
+              <a:t>22/04/2018</a:t>
             </a:fld>
             <a:endParaRPr lang="en-GB"/>
           </a:p>
@@ -5444,7 +5435,7 @@
           <a:p>
             <a:fld id="{9A9C41D7-6BEF-4CB4-AC25-ADB6FF4C12E2}" type="datetime1">
               <a:rPr lang="en-GB" smtClean="0"/>
-              <a:t>21/04/2018</a:t>
+              <a:t>22/04/2018</a:t>
             </a:fld>
             <a:endParaRPr lang="en-GB"/>
           </a:p>
@@ -5657,7 +5648,7 @@
           <a:p>
             <a:fld id="{5589C3F4-3F66-4BB9-8E2C-6F99259E00DB}" type="datetime1">
               <a:rPr lang="en-GB" smtClean="0"/>
-              <a:t>21/04/2018</a:t>
+              <a:t>22/04/2018</a:t>
             </a:fld>
             <a:endParaRPr lang="en-GB"/>
           </a:p>
@@ -7617,7 +7608,33 @@
               <a:rPr lang="en-US" sz="1500" dirty="0" smtClean="0">
                 <a:hlinkClick r:id="rId3"/>
               </a:rPr>
-              <a:t>crisislex.org/</a:t>
+              <a:t>crisislex.org</a:t>
+            </a:r>
+            <a:r>
+              <a:rPr lang="en-US" sz="1500" dirty="0" smtClean="0">
+                <a:hlinkClick r:id="rId3"/>
+              </a:rPr>
+              <a:t>/</a:t>
+            </a:r>
+            <a:r>
+              <a:rPr lang="en-US" sz="1500" dirty="0" smtClean="0"/>
+              <a:t> (</a:t>
+            </a:r>
+            <a:r>
+              <a:rPr lang="en-GB" sz="1600" dirty="0" err="1" smtClean="0"/>
+              <a:t>olteanu</a:t>
+            </a:r>
+            <a:r>
+              <a:rPr lang="en-GB" sz="1600" dirty="0"/>
+              <a:t> </a:t>
+            </a:r>
+            <a:r>
+              <a:rPr lang="en-GB" sz="1600" dirty="0" smtClean="0"/>
+              <a:t>et al., 2015</a:t>
+            </a:r>
+            <a:r>
+              <a:rPr lang="en-US" sz="1500" dirty="0" smtClean="0"/>
+              <a:t>)</a:t>
             </a:r>
             <a:endParaRPr lang="en-US" sz="1500" dirty="0"/>
           </a:p>
@@ -7648,7 +7665,25 @@
               <a:rPr lang="en-US" sz="1500" dirty="0" smtClean="0">
                 <a:hlinkClick r:id="rId4"/>
               </a:rPr>
-              <a:t>crisisnlp.qcri.org/</a:t>
+              <a:t>crisisnlp.qcri.org</a:t>
+            </a:r>
+            <a:r>
+              <a:rPr lang="en-US" sz="1500" dirty="0" smtClean="0">
+                <a:hlinkClick r:id="rId4"/>
+              </a:rPr>
+              <a:t>/</a:t>
+            </a:r>
+            <a:r>
+              <a:rPr lang="en-US" sz="1500" dirty="0" smtClean="0"/>
+              <a:t> (</a:t>
+            </a:r>
+            <a:r>
+              <a:rPr lang="en-GB" sz="1600" dirty="0" smtClean="0"/>
+              <a:t>Nguyen et al., 2016</a:t>
+            </a:r>
+            <a:r>
+              <a:rPr lang="en-US" sz="1500" dirty="0" smtClean="0"/>
+              <a:t>)</a:t>
             </a:r>
             <a:endParaRPr lang="en-US" dirty="0"/>
           </a:p>
@@ -8417,11 +8452,7 @@
           <a:p>
             <a:r>
               <a:rPr lang="en-US" sz="4000" dirty="0" smtClean="0"/>
-              <a:t>Processing and Training </a:t>
-            </a:r>
-            <a:r>
-              <a:rPr lang="en-US" sz="4000" dirty="0" smtClean="0"/>
-              <a:t>Approach (1)</a:t>
+              <a:t>Processing and Training Approach (1)</a:t>
             </a:r>
             <a:endParaRPr lang="en-US" sz="4000" dirty="0"/>
           </a:p>
@@ -9587,15 +9618,7 @@
             </a:pPr>
             <a:r>
               <a:rPr lang="en-US" dirty="0"/>
-              <a:t>Minimum </a:t>
-            </a:r>
-            <a:r>
-              <a:rPr lang="en-US" dirty="0"/>
-              <a:t>f</a:t>
-            </a:r>
-            <a:r>
-              <a:rPr lang="en-US" dirty="0"/>
-              <a:t>eature engineering</a:t>
+              <a:t>Minimum feature engineering</a:t>
             </a:r>
           </a:p>
           <a:p>
@@ -9827,7 +9850,6 @@
               <a:rPr lang="en-GB" dirty="0"/>
               <a:t>‘Traditional’ ML</a:t>
             </a:r>
-            <a:endParaRPr lang="en-GB" dirty="0"/>
           </a:p>
           <a:p>
             <a:pPr marL="285750" indent="-285750">
@@ -9836,23 +9858,7 @@
             </a:pPr>
             <a:r>
               <a:rPr lang="en-GB" dirty="0"/>
-              <a:t>Standard </a:t>
-            </a:r>
-            <a:r>
-              <a:rPr lang="en-GB" dirty="0"/>
-              <a:t>classifiers </a:t>
-            </a:r>
-            <a:r>
-              <a:rPr lang="en-GB" dirty="0"/>
-              <a:t>(e.g., SVM</a:t>
-            </a:r>
-            <a:r>
-              <a:rPr lang="en-GB" dirty="0"/>
-              <a:t>, </a:t>
-            </a:r>
-            <a:r>
-              <a:rPr lang="en-GB" dirty="0"/>
-              <a:t>J48…).</a:t>
+              <a:t>Standard classifiers (e.g., SVM, J48…).</a:t>
             </a:r>
           </a:p>
           <a:p>
@@ -9862,23 +9868,7 @@
             </a:pPr>
             <a:r>
               <a:rPr lang="en-GB" dirty="0"/>
-              <a:t>Feature </a:t>
-            </a:r>
-            <a:r>
-              <a:rPr lang="en-GB" dirty="0"/>
-              <a:t>engineering  (e.g</a:t>
-            </a:r>
-            <a:r>
-              <a:rPr lang="en-GB" dirty="0"/>
-              <a:t>., </a:t>
-            </a:r>
-            <a:r>
-              <a:rPr lang="en-GB" dirty="0"/>
-              <a:t>lemmatisation, </a:t>
-            </a:r>
-            <a:r>
-              <a:rPr lang="en-GB" dirty="0"/>
-              <a:t> TF-IDF…).</a:t>
+              <a:t>Feature engineering  (e.g., lemmatisation,  TF-IDF…).</a:t>
             </a:r>
           </a:p>
           <a:p>
@@ -9888,17 +9878,8 @@
             </a:pPr>
             <a:r>
               <a:rPr lang="en-GB" dirty="0"/>
-              <a:t>Bag </a:t>
-            </a:r>
-            <a:r>
-              <a:rPr lang="en-GB" dirty="0"/>
-              <a:t>of </a:t>
-            </a:r>
-            <a:r>
-              <a:rPr lang="en-GB" dirty="0"/>
-              <a:t>words.</a:t>
-            </a:r>
-            <a:endParaRPr lang="en-GB" dirty="0"/>
+              <a:t>Bag of words.</a:t>
+            </a:r>
           </a:p>
         </p:txBody>
       </p:sp>
@@ -11368,8 +11349,16 @@
               <a:t>(Crisis Event Extraction Service</a:t>
             </a:r>
             <a:r>
+              <a:rPr lang="en-GB" sz="2400" smtClean="0"/>
+              <a:t>) </a:t>
+            </a:r>
+            <a:r>
+              <a:rPr lang="en-GB" sz="2400" smtClean="0"/>
+              <a:t>(Burel et al., 2018) use </a:t>
+            </a:r>
+            <a:r>
               <a:rPr lang="en-GB" sz="2400" dirty="0" smtClean="0"/>
-              <a:t>) use CNNs to </a:t>
+              <a:t>CNNs to </a:t>
             </a:r>
             <a:r>
               <a:rPr lang="en-GB" sz="2400" dirty="0"/>
@@ -11711,11 +11700,7 @@
           <a:p>
             <a:r>
               <a:rPr lang="en-GB" dirty="0" smtClean="0"/>
-              <a:t>Publically available tools and </a:t>
-            </a:r>
-            <a:r>
-              <a:rPr lang="en-GB" dirty="0" smtClean="0"/>
-              <a:t>APIs can be used for </a:t>
+              <a:t>Publically available tools and APIs can be used for </a:t>
             </a:r>
             <a:r>
               <a:rPr lang="en-GB" b="1" dirty="0" smtClean="0"/>
@@ -12865,14 +12850,7 @@
                 <a:ea typeface="Open Sans" charset="0"/>
                 <a:cs typeface="Open Sans" charset="0"/>
               </a:rPr>
-              <a:t>E.g., </a:t>
-            </a:r>
-            <a:r>
-              <a:rPr lang="en-US" sz="2400" dirty="0" smtClean="0">
-                <a:ea typeface="Open Sans" charset="0"/>
-                <a:cs typeface="Open Sans" charset="0"/>
-              </a:rPr>
-              <a:t>CNN</a:t>
+              <a:t>E.g., CNN</a:t>
             </a:r>
             <a:r>
               <a:rPr lang="en-US" sz="2400" dirty="0">

</xml_diff>

<commit_message>
Updating 6- Visualisation slides
</commit_message>
<xml_diff>
--- a/slides/pptx/4-classification.pptx
+++ b/slides/pptx/4-classification.pptx
@@ -721,7 +721,7 @@
             </a:r>
             <a:r>
               <a:rPr lang="en-US" baseline="0" dirty="0" smtClean="0"/>
-              <a:t> So, in the above example we find out following number of nouns verbs, pronouns, length etc. So the overall feature set representation looks like this. Token 1 to Token N are basically different </a:t>
+              <a:t> So, from the above example we find out following number of nouns verbs, pronouns, length etc. So the overall feature set representation looks like this. Token 1 to Token N are basically different </a:t>
             </a:r>
             <a:r>
               <a:rPr lang="en-US" baseline="0" dirty="0" err="1" smtClean="0"/>
@@ -729,7 +729,19 @@
             </a:r>
             <a:r>
               <a:rPr lang="en-US" baseline="0" dirty="0" smtClean="0"/>
-              <a:t>-grams in a text and then these 6 statistical features. In this type of case, we </a:t>
+              <a:t>-grams in a </a:t>
+            </a:r>
+            <a:r>
+              <a:rPr lang="en-US" baseline="0" dirty="0" smtClean="0"/>
+              <a:t>text (</a:t>
+            </a:r>
+            <a:r>
+              <a:rPr lang="en-US" baseline="0" smtClean="0"/>
+              <a:t>include semantics) </a:t>
+            </a:r>
+            <a:r>
+              <a:rPr lang="en-US" baseline="0" dirty="0" smtClean="0"/>
+              <a:t>and then these 6 statistical features. In this type of case, we </a:t>
             </a:r>
             <a:r>
               <a:rPr lang="en-US" baseline="0" dirty="0" err="1" smtClean="0"/>
@@ -3160,11 +3172,7 @@
             </a:r>
             <a:r>
               <a:rPr lang="en-US" baseline="0" dirty="0" smtClean="0"/>
-              <a:t> and augment them to the </a:t>
-            </a:r>
-            <a:r>
-              <a:rPr lang="en-US" baseline="0" smtClean="0"/>
-              <a:t>overall context.</a:t>
+              <a:t> and augment them to the overall context.</a:t>
             </a:r>
             <a:endParaRPr lang="en-US" dirty="0"/>
           </a:p>

</xml_diff>